<commit_message>
update at 5PM on Nov-22
</commit_message>
<xml_diff>
--- a/course_project/submissions/project_presentation.pptx
+++ b/course_project/submissions/project_presentation.pptx
@@ -111,6 +111,11 @@
       </a:defRPr>
     </a:lvl9pPr>
   </p:defaultTextStyle>
+  <p:extLst>
+    <p:ext uri="{EFAFB233-063F-42B5-8137-9DF3F51BA10A}">
+      <p15:sldGuideLst xmlns:p15="http://schemas.microsoft.com/office/powerpoint/2012/main"/>
+    </p:ext>
+  </p:extLst>
 </p:presentation>
 </file>
 
@@ -261,7 +266,7 @@
           <a:p>
             <a:fld id="{2F97AEB4-988A-524D-BF0A-88071E08C198}" type="datetimeFigureOut">
               <a:rPr lang="en-US" smtClean="0"/>
-              <a:t>11/21/21</a:t>
+              <a:t>11/22/21</a:t>
             </a:fld>
             <a:endParaRPr lang="en-US"/>
           </a:p>
@@ -459,7 +464,7 @@
           <a:p>
             <a:fld id="{2F97AEB4-988A-524D-BF0A-88071E08C198}" type="datetimeFigureOut">
               <a:rPr lang="en-US" smtClean="0"/>
-              <a:t>11/21/21</a:t>
+              <a:t>11/22/21</a:t>
             </a:fld>
             <a:endParaRPr lang="en-US"/>
           </a:p>
@@ -667,7 +672,7 @@
           <a:p>
             <a:fld id="{2F97AEB4-988A-524D-BF0A-88071E08C198}" type="datetimeFigureOut">
               <a:rPr lang="en-US" smtClean="0"/>
-              <a:t>11/21/21</a:t>
+              <a:t>11/22/21</a:t>
             </a:fld>
             <a:endParaRPr lang="en-US"/>
           </a:p>
@@ -865,7 +870,7 @@
           <a:p>
             <a:fld id="{2F97AEB4-988A-524D-BF0A-88071E08C198}" type="datetimeFigureOut">
               <a:rPr lang="en-US" smtClean="0"/>
-              <a:t>11/21/21</a:t>
+              <a:t>11/22/21</a:t>
             </a:fld>
             <a:endParaRPr lang="en-US"/>
           </a:p>
@@ -1140,7 +1145,7 @@
           <a:p>
             <a:fld id="{2F97AEB4-988A-524D-BF0A-88071E08C198}" type="datetimeFigureOut">
               <a:rPr lang="en-US" smtClean="0"/>
-              <a:t>11/21/21</a:t>
+              <a:t>11/22/21</a:t>
             </a:fld>
             <a:endParaRPr lang="en-US"/>
           </a:p>
@@ -1405,7 +1410,7 @@
           <a:p>
             <a:fld id="{2F97AEB4-988A-524D-BF0A-88071E08C198}" type="datetimeFigureOut">
               <a:rPr lang="en-US" smtClean="0"/>
-              <a:t>11/21/21</a:t>
+              <a:t>11/22/21</a:t>
             </a:fld>
             <a:endParaRPr lang="en-US"/>
           </a:p>
@@ -1817,7 +1822,7 @@
           <a:p>
             <a:fld id="{2F97AEB4-988A-524D-BF0A-88071E08C198}" type="datetimeFigureOut">
               <a:rPr lang="en-US" smtClean="0"/>
-              <a:t>11/21/21</a:t>
+              <a:t>11/22/21</a:t>
             </a:fld>
             <a:endParaRPr lang="en-US"/>
           </a:p>
@@ -1958,7 +1963,7 @@
           <a:p>
             <a:fld id="{2F97AEB4-988A-524D-BF0A-88071E08C198}" type="datetimeFigureOut">
               <a:rPr lang="en-US" smtClean="0"/>
-              <a:t>11/21/21</a:t>
+              <a:t>11/22/21</a:t>
             </a:fld>
             <a:endParaRPr lang="en-US"/>
           </a:p>
@@ -2071,7 +2076,7 @@
           <a:p>
             <a:fld id="{2F97AEB4-988A-524D-BF0A-88071E08C198}" type="datetimeFigureOut">
               <a:rPr lang="en-US" smtClean="0"/>
-              <a:t>11/21/21</a:t>
+              <a:t>11/22/21</a:t>
             </a:fld>
             <a:endParaRPr lang="en-US"/>
           </a:p>
@@ -2382,7 +2387,7 @@
           <a:p>
             <a:fld id="{2F97AEB4-988A-524D-BF0A-88071E08C198}" type="datetimeFigureOut">
               <a:rPr lang="en-US" smtClean="0"/>
-              <a:t>11/21/21</a:t>
+              <a:t>11/22/21</a:t>
             </a:fld>
             <a:endParaRPr lang="en-US"/>
           </a:p>
@@ -2670,7 +2675,7 @@
           <a:p>
             <a:fld id="{2F97AEB4-988A-524D-BF0A-88071E08C198}" type="datetimeFigureOut">
               <a:rPr lang="en-US" smtClean="0"/>
-              <a:t>11/21/21</a:t>
+              <a:t>11/22/21</a:t>
             </a:fld>
             <a:endParaRPr lang="en-US"/>
           </a:p>
@@ -2911,7 +2916,7 @@
           <a:p>
             <a:fld id="{2F97AEB4-988A-524D-BF0A-88071E08C198}" type="datetimeFigureOut">
               <a:rPr lang="en-US" smtClean="0"/>
-              <a:t>11/21/21</a:t>
+              <a:t>11/22/21</a:t>
             </a:fld>
             <a:endParaRPr lang="en-US"/>
           </a:p>
@@ -6351,8 +6356,12 @@
           <a:lstStyle/>
           <a:p>
             <a:r>
+              <a:rPr lang="en-US" dirty="0"/>
+              <a:t>*</a:t>
+            </a:r>
+            <a:r>
               <a:rPr lang="en-US" u="sng" dirty="0"/>
-              <a:t>Average Percentage Error</a:t>
+              <a:t> Average Percentage Error</a:t>
             </a:r>
             <a:r>
               <a:rPr lang="en-US" dirty="0"/>
@@ -6365,7 +6374,7 @@
           <a:p>
             <a:r>
               <a:rPr lang="en-US" dirty="0"/>
-              <a:t>* I couldn’t calculate an average percentage error for the test set, since they don’t provide the sale price for the test data on Kaggle. Based on the higher RMSE on the test set relative to the train set, the percent error is clearly higher than 10.65% on average.</a:t>
+              <a:t>- I couldn’t calculate an average percentage error for the test set, since they don’t provide the sale price for the test data on Kaggle. Based on the higher RMSE on the test set relative to the train set, the percent error is clearly higher than 10.65% on average.</a:t>
             </a:r>
           </a:p>
         </p:txBody>

</xml_diff>